<commit_message>
Added Parse.com schema definition to Mock-Up file
I've completed the schema definition and tables on the service are
created.  I have initial data pop EXCEPT for videos complete there.  I
hope to have videos populated tomorrow.
</commit_message>
<xml_diff>
--- a/resources/Mock-Ups for VineCache.pptx
+++ b/resources/Mock-Ups for VineCache.pptx
@@ -18,6 +18,7 @@
     <p:sldId id="265" r:id="rId12"/>
     <p:sldId id="266" r:id="rId13"/>
     <p:sldId id="267" r:id="rId14"/>
+    <p:sldId id="269" r:id="rId15"/>
   </p:sldIdLst>
   <p:sldSz cx="12192000" cy="6858000"/>
   <p:notesSz cx="6858000" cy="9144000"/>
@@ -3169,11 +3170,7 @@
           <a:p>
             <a:r>
               <a:rPr lang="en-US" dirty="0" smtClean="0"/>
-              <a:t>Looke</a:t>
-            </a:r>
-            <a:r>
-              <a:rPr lang="en-US" dirty="0" smtClean="0"/>
-              <a:t>d at </a:t>
+              <a:t>Looked at </a:t>
             </a:r>
             <a:r>
               <a:rPr lang="en-US" dirty="0" err="1" smtClean="0"/>
@@ -3283,7 +3280,6 @@
               <a:rPr lang="en-US" dirty="0" smtClean="0"/>
               <a:t>Data-store </a:t>
             </a:r>
-            <a:endParaRPr lang="en-US" dirty="0" smtClean="0"/>
           </a:p>
           <a:p>
             <a:pPr lvl="1"/>
@@ -3303,11 +3299,7 @@
           <a:p>
             <a:r>
               <a:rPr lang="en-US" dirty="0" smtClean="0"/>
-              <a:t>Identity </a:t>
-            </a:r>
-            <a:r>
-              <a:rPr lang="en-US" dirty="0" smtClean="0"/>
-              <a:t>– Facebook</a:t>
+              <a:t>Identity – Facebook</a:t>
             </a:r>
           </a:p>
           <a:p>
@@ -3442,11 +3434,7 @@
           <a:p>
             <a:r>
               <a:rPr lang="en-US" dirty="0" smtClean="0"/>
-              <a:t>Node.js and Express hosted </a:t>
-            </a:r>
-            <a:r>
-              <a:rPr lang="en-US" dirty="0" smtClean="0"/>
-              <a:t>on AWS Elastic Beanstalk</a:t>
+              <a:t>Node.js and Express hosted on AWS Elastic Beanstalk</a:t>
             </a:r>
           </a:p>
           <a:p>
@@ -3468,6 +3456,60 @@
     <p:extLst>
       <p:ext uri="{BB962C8B-B14F-4D97-AF65-F5344CB8AC3E}">
         <p14:creationId xmlns:p14="http://schemas.microsoft.com/office/powerpoint/2010/main" val="2753217959"/>
+      </p:ext>
+    </p:extLst>
+  </p:cSld>
+  <p:clrMapOvr>
+    <a:masterClrMapping/>
+  </p:clrMapOvr>
+</p:sld>
+</file>
+
+<file path=ppt/slides/slide14.xml><?xml version="1.0" encoding="utf-8"?>
+<p:sld xmlns:a="http://schemas.openxmlformats.org/drawingml/2006/main" xmlns:r="http://schemas.openxmlformats.org/officeDocument/2006/relationships" xmlns:p="http://schemas.openxmlformats.org/presentationml/2006/main">
+  <p:cSld>
+    <p:spTree>
+      <p:nvGrpSpPr>
+        <p:cNvPr id="1" name=""/>
+        <p:cNvGrpSpPr/>
+        <p:nvPr/>
+      </p:nvGrpSpPr>
+      <p:grpSpPr>
+        <a:xfrm>
+          <a:off x="0" y="0"/>
+          <a:ext cx="0" cy="0"/>
+          <a:chOff x="0" y="0"/>
+          <a:chExt cx="0" cy="0"/>
+        </a:xfrm>
+      </p:grpSpPr>
+      <p:pic>
+        <p:nvPicPr>
+          <p:cNvPr id="3" name="Picture 2"/>
+          <p:cNvPicPr>
+            <a:picLocks noChangeAspect="1"/>
+          </p:cNvPicPr>
+          <p:nvPr/>
+        </p:nvPicPr>
+        <p:blipFill>
+          <a:blip r:embed="rId2"/>
+          <a:stretch>
+            <a:fillRect/>
+          </a:stretch>
+        </p:blipFill>
+        <p:spPr>
+          <a:xfrm>
+            <a:off x="2604193" y="2060562"/>
+            <a:ext cx="6983614" cy="2736875"/>
+          </a:xfrm>
+          <a:prstGeom prst="rect">
+            <a:avLst/>
+          </a:prstGeom>
+        </p:spPr>
+      </p:pic>
+    </p:spTree>
+    <p:extLst>
+      <p:ext uri="{BB962C8B-B14F-4D97-AF65-F5344CB8AC3E}">
+        <p14:creationId xmlns:p14="http://schemas.microsoft.com/office/powerpoint/2010/main" val="1475199673"/>
       </p:ext>
     </p:extLst>
   </p:cSld>

</xml_diff>